<commit_message>
Calibrated for all LED scenarios
</commit_message>
<xml_diff>
--- a/Segmentation/The Recalibration of STEVE.pptx
+++ b/Segmentation/The Recalibration of STEVE.pptx
@@ -22,6 +22,7 @@
     <p:sldId id="289" r:id="rId19"/>
     <p:sldId id="290" r:id="rId20"/>
     <p:sldId id="291" r:id="rId21"/>
+    <p:sldId id="292" r:id="rId22"/>
   </p:sldIdLst>
   <p:sldSz cx="12192000" cy="6858000"/>
   <p:notesSz cx="6858000" cy="9144000"/>
@@ -120,7 +121,89 @@
       </a:defRPr>
     </a:lvl9pPr>
   </p:defaultTextStyle>
+  <p:extLst>
+    <p:ext uri="{EFAFB233-063F-42B5-8137-9DF3F51BA10A}">
+      <p15:sldGuideLst xmlns:p15="http://schemas.microsoft.com/office/powerpoint/2012/main"/>
+    </p:ext>
+  </p:extLst>
 </p:presentation>
+</file>
+
+<file path=ppt/changesInfos/changesInfo1.xml><?xml version="1.0" encoding="utf-8"?>
+<pc:chgInfo xmlns:a="http://schemas.openxmlformats.org/drawingml/2006/main" xmlns:r="http://schemas.openxmlformats.org/officeDocument/2006/relationships" xmlns:ac="http://schemas.microsoft.com/office/drawing/2013/main/command" xmlns:pc="http://schemas.microsoft.com/office/powerpoint/2013/main/command">
+  <pc:docChgLst>
+    <pc:chgData name="James Dixon" userId="dbe9c319-724c-4517-9577-2868fd82f556" providerId="ADAL" clId="{82DB4395-BE40-4187-9C57-D49FB38DD1BB}"/>
+    <pc:docChg chg="undo custSel addSld modSld">
+      <pc:chgData name="James Dixon" userId="dbe9c319-724c-4517-9577-2868fd82f556" providerId="ADAL" clId="{82DB4395-BE40-4187-9C57-D49FB38DD1BB}" dt="2022-08-18T07:46:10.010" v="43" actId="1076"/>
+      <pc:docMkLst>
+        <pc:docMk/>
+      </pc:docMkLst>
+      <pc:sldChg chg="addSp delSp modSp add">
+        <pc:chgData name="James Dixon" userId="dbe9c319-724c-4517-9577-2868fd82f556" providerId="ADAL" clId="{82DB4395-BE40-4187-9C57-D49FB38DD1BB}" dt="2022-08-18T07:46:10.010" v="43" actId="1076"/>
+        <pc:sldMkLst>
+          <pc:docMk/>
+          <pc:sldMk cId="1001506586" sldId="292"/>
+        </pc:sldMkLst>
+        <pc:spChg chg="del">
+          <ac:chgData name="James Dixon" userId="dbe9c319-724c-4517-9577-2868fd82f556" providerId="ADAL" clId="{82DB4395-BE40-4187-9C57-D49FB38DD1BB}" dt="2022-08-18T07:43:42.500" v="3" actId="478"/>
+          <ac:spMkLst>
+            <pc:docMk/>
+            <pc:sldMk cId="1001506586" sldId="292"/>
+            <ac:spMk id="2" creationId="{80F0B654-9207-40EA-BBE7-59419B990C51}"/>
+          </ac:spMkLst>
+        </pc:spChg>
+        <pc:spChg chg="del">
+          <ac:chgData name="James Dixon" userId="dbe9c319-724c-4517-9577-2868fd82f556" providerId="ADAL" clId="{82DB4395-BE40-4187-9C57-D49FB38DD1BB}" dt="2022-08-18T07:43:40.423" v="1" actId="478"/>
+          <ac:spMkLst>
+            <pc:docMk/>
+            <pc:sldMk cId="1001506586" sldId="292"/>
+            <ac:spMk id="3" creationId="{D3937926-E098-40C9-B143-141AAE4A5FAF}"/>
+          </ac:spMkLst>
+        </pc:spChg>
+        <pc:spChg chg="del">
+          <ac:chgData name="James Dixon" userId="dbe9c319-724c-4517-9577-2868fd82f556" providerId="ADAL" clId="{82DB4395-BE40-4187-9C57-D49FB38DD1BB}" dt="2022-08-18T07:43:41.346" v="2" actId="478"/>
+          <ac:spMkLst>
+            <pc:docMk/>
+            <pc:sldMk cId="1001506586" sldId="292"/>
+            <ac:spMk id="4" creationId="{0D8D3FF5-86C7-41BB-B0B0-DFEC08A9BC61}"/>
+          </ac:spMkLst>
+        </pc:spChg>
+        <pc:spChg chg="add mod">
+          <ac:chgData name="James Dixon" userId="dbe9c319-724c-4517-9577-2868fd82f556" providerId="ADAL" clId="{82DB4395-BE40-4187-9C57-D49FB38DD1BB}" dt="2022-08-18T07:45:00.373" v="38" actId="20577"/>
+          <ac:spMkLst>
+            <pc:docMk/>
+            <pc:sldMk cId="1001506586" sldId="292"/>
+            <ac:spMk id="11" creationId="{29AAE56E-6A5B-4138-A82A-9BA77EB616C0}"/>
+          </ac:spMkLst>
+        </pc:spChg>
+        <pc:picChg chg="add mod">
+          <ac:chgData name="James Dixon" userId="dbe9c319-724c-4517-9577-2868fd82f556" providerId="ADAL" clId="{82DB4395-BE40-4187-9C57-D49FB38DD1BB}" dt="2022-08-18T07:44:34.360" v="19" actId="1076"/>
+          <ac:picMkLst>
+            <pc:docMk/>
+            <pc:sldMk cId="1001506586" sldId="292"/>
+            <ac:picMk id="6" creationId="{84AE5A7B-81F0-45B7-B22C-02C86824AB63}"/>
+          </ac:picMkLst>
+        </pc:picChg>
+        <pc:picChg chg="add mod">
+          <ac:chgData name="James Dixon" userId="dbe9c319-724c-4517-9577-2868fd82f556" providerId="ADAL" clId="{82DB4395-BE40-4187-9C57-D49FB38DD1BB}" dt="2022-08-18T07:46:07.288" v="42" actId="1076"/>
+          <ac:picMkLst>
+            <pc:docMk/>
+            <pc:sldMk cId="1001506586" sldId="292"/>
+            <ac:picMk id="8" creationId="{1F297E22-3A95-43FF-A693-9B45A426EA22}"/>
+          </ac:picMkLst>
+        </pc:picChg>
+        <pc:picChg chg="add mod">
+          <ac:chgData name="James Dixon" userId="dbe9c319-724c-4517-9577-2868fd82f556" providerId="ADAL" clId="{82DB4395-BE40-4187-9C57-D49FB38DD1BB}" dt="2022-08-18T07:46:10.010" v="43" actId="1076"/>
+          <ac:picMkLst>
+            <pc:docMk/>
+            <pc:sldMk cId="1001506586" sldId="292"/>
+            <ac:picMk id="10" creationId="{9277016F-F8EC-4AE7-B94C-8A54F9FB5E34}"/>
+          </ac:picMkLst>
+        </pc:picChg>
+      </pc:sldChg>
+    </pc:docChg>
+  </pc:docChgLst>
+</pc:chgInfo>
 </file>
 
 <file path=ppt/slideLayouts/slideLayout1.xml><?xml version="1.0" encoding="utf-8"?>
@@ -272,7 +355,7 @@
           <a:p>
             <a:fld id="{7148CB51-DE31-48D1-8144-9AF9E8D1381D}" type="datetimeFigureOut">
               <a:rPr lang="en-GB" smtClean="0"/>
-              <a:t>17/08/2022</a:t>
+              <a:t>18/08/2022</a:t>
             </a:fld>
             <a:endParaRPr lang="en-GB"/>
           </a:p>
@@ -472,7 +555,7 @@
           <a:p>
             <a:fld id="{7148CB51-DE31-48D1-8144-9AF9E8D1381D}" type="datetimeFigureOut">
               <a:rPr lang="en-GB" smtClean="0"/>
-              <a:t>17/08/2022</a:t>
+              <a:t>18/08/2022</a:t>
             </a:fld>
             <a:endParaRPr lang="en-GB"/>
           </a:p>
@@ -682,7 +765,7 @@
           <a:p>
             <a:fld id="{7148CB51-DE31-48D1-8144-9AF9E8D1381D}" type="datetimeFigureOut">
               <a:rPr lang="en-GB" smtClean="0"/>
-              <a:t>17/08/2022</a:t>
+              <a:t>18/08/2022</a:t>
             </a:fld>
             <a:endParaRPr lang="en-GB"/>
           </a:p>
@@ -882,7 +965,7 @@
           <a:p>
             <a:fld id="{7148CB51-DE31-48D1-8144-9AF9E8D1381D}" type="datetimeFigureOut">
               <a:rPr lang="en-GB" smtClean="0"/>
-              <a:t>17/08/2022</a:t>
+              <a:t>18/08/2022</a:t>
             </a:fld>
             <a:endParaRPr lang="en-GB"/>
           </a:p>
@@ -1158,7 +1241,7 @@
           <a:p>
             <a:fld id="{7148CB51-DE31-48D1-8144-9AF9E8D1381D}" type="datetimeFigureOut">
               <a:rPr lang="en-GB" smtClean="0"/>
-              <a:t>17/08/2022</a:t>
+              <a:t>18/08/2022</a:t>
             </a:fld>
             <a:endParaRPr lang="en-GB"/>
           </a:p>
@@ -1426,7 +1509,7 @@
           <a:p>
             <a:fld id="{7148CB51-DE31-48D1-8144-9AF9E8D1381D}" type="datetimeFigureOut">
               <a:rPr lang="en-GB" smtClean="0"/>
-              <a:t>17/08/2022</a:t>
+              <a:t>18/08/2022</a:t>
             </a:fld>
             <a:endParaRPr lang="en-GB"/>
           </a:p>
@@ -1841,7 +1924,7 @@
           <a:p>
             <a:fld id="{7148CB51-DE31-48D1-8144-9AF9E8D1381D}" type="datetimeFigureOut">
               <a:rPr lang="en-GB" smtClean="0"/>
-              <a:t>17/08/2022</a:t>
+              <a:t>18/08/2022</a:t>
             </a:fld>
             <a:endParaRPr lang="en-GB"/>
           </a:p>
@@ -1983,7 +2066,7 @@
           <a:p>
             <a:fld id="{7148CB51-DE31-48D1-8144-9AF9E8D1381D}" type="datetimeFigureOut">
               <a:rPr lang="en-GB" smtClean="0"/>
-              <a:t>17/08/2022</a:t>
+              <a:t>18/08/2022</a:t>
             </a:fld>
             <a:endParaRPr lang="en-GB"/>
           </a:p>
@@ -2096,7 +2179,7 @@
           <a:p>
             <a:fld id="{7148CB51-DE31-48D1-8144-9AF9E8D1381D}" type="datetimeFigureOut">
               <a:rPr lang="en-GB" smtClean="0"/>
-              <a:t>17/08/2022</a:t>
+              <a:t>18/08/2022</a:t>
             </a:fld>
             <a:endParaRPr lang="en-GB"/>
           </a:p>
@@ -2409,7 +2492,7 @@
           <a:p>
             <a:fld id="{7148CB51-DE31-48D1-8144-9AF9E8D1381D}" type="datetimeFigureOut">
               <a:rPr lang="en-GB" smtClean="0"/>
-              <a:t>17/08/2022</a:t>
+              <a:t>18/08/2022</a:t>
             </a:fld>
             <a:endParaRPr lang="en-GB"/>
           </a:p>
@@ -2698,7 +2781,7 @@
           <a:p>
             <a:fld id="{7148CB51-DE31-48D1-8144-9AF9E8D1381D}" type="datetimeFigureOut">
               <a:rPr lang="en-GB" smtClean="0"/>
-              <a:t>17/08/2022</a:t>
+              <a:t>18/08/2022</a:t>
             </a:fld>
             <a:endParaRPr lang="en-GB"/>
           </a:p>
@@ -2941,7 +3024,7 @@
           <a:p>
             <a:fld id="{7148CB51-DE31-48D1-8144-9AF9E8D1381D}" type="datetimeFigureOut">
               <a:rPr lang="en-GB" smtClean="0"/>
-              <a:t>17/08/2022</a:t>
+              <a:t>18/08/2022</a:t>
             </a:fld>
             <a:endParaRPr lang="en-GB"/>
           </a:p>
@@ -4414,6 +4497,172 @@
 </p:sld>
 </file>
 
+<file path=ppt/slides/slide18.xml><?xml version="1.0" encoding="utf-8"?>
+<p:sld xmlns:a="http://schemas.openxmlformats.org/drawingml/2006/main" xmlns:r="http://schemas.openxmlformats.org/officeDocument/2006/relationships" xmlns:p="http://schemas.openxmlformats.org/presentationml/2006/main">
+  <p:cSld>
+    <p:spTree>
+      <p:nvGrpSpPr>
+        <p:cNvPr id="1" name=""/>
+        <p:cNvGrpSpPr/>
+        <p:nvPr/>
+      </p:nvGrpSpPr>
+      <p:grpSpPr>
+        <a:xfrm>
+          <a:off x="0" y="0"/>
+          <a:ext cx="0" cy="0"/>
+          <a:chOff x="0" y="0"/>
+          <a:chExt cx="0" cy="0"/>
+        </a:xfrm>
+      </p:grpSpPr>
+      <p:pic>
+        <p:nvPicPr>
+          <p:cNvPr id="6" name="Picture 5">
+            <a:extLst>
+              <a:ext uri="{FF2B5EF4-FFF2-40B4-BE49-F238E27FC236}">
+                <a16:creationId xmlns:a16="http://schemas.microsoft.com/office/drawing/2014/main" id="{84AE5A7B-81F0-45B7-B22C-02C86824AB63}"/>
+              </a:ext>
+            </a:extLst>
+          </p:cNvPr>
+          <p:cNvPicPr>
+            <a:picLocks noChangeAspect="1"/>
+          </p:cNvPicPr>
+          <p:nvPr/>
+        </p:nvPicPr>
+        <p:blipFill>
+          <a:blip r:embed="rId2">
+            <a:extLst>
+              <a:ext uri="{28A0092B-C50C-407E-A947-70E740481C1C}">
+                <a14:useLocalDpi xmlns:a14="http://schemas.microsoft.com/office/drawing/2010/main" val="0"/>
+              </a:ext>
+            </a:extLst>
+          </a:blip>
+          <a:stretch>
+            <a:fillRect/>
+          </a:stretch>
+        </p:blipFill>
+        <p:spPr>
+          <a:xfrm>
+            <a:off x="4204023" y="2083012"/>
+            <a:ext cx="3783953" cy="2837964"/>
+          </a:xfrm>
+          <a:prstGeom prst="rect">
+            <a:avLst/>
+          </a:prstGeom>
+        </p:spPr>
+      </p:pic>
+      <p:pic>
+        <p:nvPicPr>
+          <p:cNvPr id="8" name="Picture 7">
+            <a:extLst>
+              <a:ext uri="{FF2B5EF4-FFF2-40B4-BE49-F238E27FC236}">
+                <a16:creationId xmlns:a16="http://schemas.microsoft.com/office/drawing/2014/main" id="{1F297E22-3A95-43FF-A693-9B45A426EA22}"/>
+              </a:ext>
+            </a:extLst>
+          </p:cNvPr>
+          <p:cNvPicPr>
+            <a:picLocks noChangeAspect="1"/>
+          </p:cNvPicPr>
+          <p:nvPr/>
+        </p:nvPicPr>
+        <p:blipFill>
+          <a:blip r:embed="rId3">
+            <a:extLst>
+              <a:ext uri="{28A0092B-C50C-407E-A947-70E740481C1C}">
+                <a14:useLocalDpi xmlns:a14="http://schemas.microsoft.com/office/drawing/2010/main" val="0"/>
+              </a:ext>
+            </a:extLst>
+          </a:blip>
+          <a:stretch>
+            <a:fillRect/>
+          </a:stretch>
+        </p:blipFill>
+        <p:spPr>
+          <a:xfrm>
+            <a:off x="8330179" y="2083012"/>
+            <a:ext cx="3861820" cy="2896365"/>
+          </a:xfrm>
+          <a:prstGeom prst="rect">
+            <a:avLst/>
+          </a:prstGeom>
+        </p:spPr>
+      </p:pic>
+      <p:pic>
+        <p:nvPicPr>
+          <p:cNvPr id="10" name="Picture 9">
+            <a:extLst>
+              <a:ext uri="{FF2B5EF4-FFF2-40B4-BE49-F238E27FC236}">
+                <a16:creationId xmlns:a16="http://schemas.microsoft.com/office/drawing/2014/main" id="{9277016F-F8EC-4AE7-B94C-8A54F9FB5E34}"/>
+              </a:ext>
+            </a:extLst>
+          </p:cNvPr>
+          <p:cNvPicPr>
+            <a:picLocks noChangeAspect="1"/>
+          </p:cNvPicPr>
+          <p:nvPr/>
+        </p:nvPicPr>
+        <p:blipFill>
+          <a:blip r:embed="rId4">
+            <a:extLst>
+              <a:ext uri="{28A0092B-C50C-407E-A947-70E740481C1C}">
+                <a14:useLocalDpi xmlns:a14="http://schemas.microsoft.com/office/drawing/2010/main" val="0"/>
+              </a:ext>
+            </a:extLst>
+          </a:blip>
+          <a:stretch>
+            <a:fillRect/>
+          </a:stretch>
+        </p:blipFill>
+        <p:spPr>
+          <a:xfrm>
+            <a:off x="70339" y="2053811"/>
+            <a:ext cx="3861820" cy="2896365"/>
+          </a:xfrm>
+          <a:prstGeom prst="rect">
+            <a:avLst/>
+          </a:prstGeom>
+        </p:spPr>
+      </p:pic>
+      <p:sp>
+        <p:nvSpPr>
+          <p:cNvPr id="11" name="Title 10">
+            <a:extLst>
+              <a:ext uri="{FF2B5EF4-FFF2-40B4-BE49-F238E27FC236}">
+                <a16:creationId xmlns:a16="http://schemas.microsoft.com/office/drawing/2014/main" id="{29AAE56E-6A5B-4138-A82A-9BA77EB616C0}"/>
+              </a:ext>
+            </a:extLst>
+          </p:cNvPr>
+          <p:cNvSpPr>
+            <a:spLocks noGrp="1"/>
+          </p:cNvSpPr>
+          <p:nvPr>
+            <p:ph type="title"/>
+          </p:nvPr>
+        </p:nvSpPr>
+        <p:spPr/>
+        <p:txBody>
+          <a:bodyPr/>
+          <a:lstStyle/>
+          <a:p>
+            <a:r>
+              <a:rPr lang="en-GB" dirty="0"/>
+              <a:t>That’ll do pig</a:t>
+            </a:r>
+          </a:p>
+        </p:txBody>
+      </p:sp>
+    </p:spTree>
+    <p:extLst>
+      <p:ext uri="{BB962C8B-B14F-4D97-AF65-F5344CB8AC3E}">
+        <p14:creationId xmlns:p14="http://schemas.microsoft.com/office/powerpoint/2010/main" val="1001506586"/>
+      </p:ext>
+    </p:extLst>
+  </p:cSld>
+  <p:clrMapOvr>
+    <a:masterClrMapping/>
+  </p:clrMapOvr>
+</p:sld>
+</file>
+
 <file path=ppt/slides/slide2.xml><?xml version="1.0" encoding="utf-8"?>
 <p:sld xmlns:a="http://schemas.openxmlformats.org/drawingml/2006/main" xmlns:r="http://schemas.openxmlformats.org/officeDocument/2006/relationships" xmlns:p="http://schemas.openxmlformats.org/presentationml/2006/main">
   <p:cSld>
@@ -5837,6 +6086,21 @@
 </file>
 
 <file path=customXml/item1.xml><?xml version="1.0" encoding="utf-8"?>
+<?mso-contentType ?>
+<FormTemplates xmlns="http://schemas.microsoft.com/sharepoint/v3/contenttype/forms">
+  <Display>DocumentLibraryForm</Display>
+  <Edit>DocumentLibraryForm</Edit>
+  <New>DocumentLibraryForm</New>
+</FormTemplates>
+</file>
+
+<file path=customXml/item2.xml><?xml version="1.0" encoding="utf-8"?>
+<p:properties xmlns:p="http://schemas.microsoft.com/office/2006/metadata/properties" xmlns:xsi="http://www.w3.org/2001/XMLSchema-instance" xmlns:pc="http://schemas.microsoft.com/office/infopath/2007/PartnerControls">
+  <documentManagement/>
+</p:properties>
+</file>
+
+<file path=customXml/item3.xml><?xml version="1.0" encoding="utf-8"?>
 <ct:contentTypeSchema xmlns:ct="http://schemas.microsoft.com/office/2006/metadata/contentType" xmlns:ma="http://schemas.microsoft.com/office/2006/metadata/properties/metaAttributes" ct:_="" ma:_="" ma:contentTypeName="Document" ma:contentTypeID="0x010100C4F4B9C8D4E5FB419F9CC5D98855FC2A" ma:contentTypeVersion="14" ma:contentTypeDescription="Create a new document." ma:contentTypeScope="" ma:versionID="9cf8284581602febe1d90350234520ed">
   <xsd:schema xmlns:xsd="http://www.w3.org/2001/XMLSchema" xmlns:xs="http://www.w3.org/2001/XMLSchema" xmlns:p="http://schemas.microsoft.com/office/2006/metadata/properties" xmlns:ns3="5845f703-aefd-4152-9ce7-4004e1ab5465" xmlns:ns4="ec776a2e-aa90-42fe-8c76-cfe3819c2a73" targetNamespace="http://schemas.microsoft.com/office/2006/metadata/properties" ma:root="true" ma:fieldsID="2659a0b3ec877205d003d3b0f3cd6207" ns3:_="" ns4:_="">
     <xsd:import namespace="5845f703-aefd-4152-9ce7-4004e1ab5465"/>
@@ -6065,22 +6329,32 @@
 </ct:contentTypeSchema>
 </file>
 
-<file path=customXml/item2.xml><?xml version="1.0" encoding="utf-8"?>
-<?mso-contentType ?>
-<FormTemplates xmlns="http://schemas.microsoft.com/sharepoint/v3/contenttype/forms">
-  <Display>DocumentLibraryForm</Display>
-  <Edit>DocumentLibraryForm</Edit>
-  <New>DocumentLibraryForm</New>
-</FormTemplates>
+<file path=customXml/itemProps1.xml><?xml version="1.0" encoding="utf-8"?>
+<ds:datastoreItem xmlns:ds="http://schemas.openxmlformats.org/officeDocument/2006/customXml" ds:itemID="{73C6DE5B-6871-4252-8E55-5680072875AF}">
+  <ds:schemaRefs>
+    <ds:schemaRef ds:uri="http://schemas.microsoft.com/sharepoint/v3/contenttype/forms"/>
+  </ds:schemaRefs>
+</ds:datastoreItem>
 </file>
 
-<file path=customXml/item3.xml><?xml version="1.0" encoding="utf-8"?>
-<p:properties xmlns:p="http://schemas.microsoft.com/office/2006/metadata/properties" xmlns:xsi="http://www.w3.org/2001/XMLSchema-instance" xmlns:pc="http://schemas.microsoft.com/office/infopath/2007/PartnerControls">
-  <documentManagement/>
-</p:properties>
+<file path=customXml/itemProps2.xml><?xml version="1.0" encoding="utf-8"?>
+<ds:datastoreItem xmlns:ds="http://schemas.openxmlformats.org/officeDocument/2006/customXml" ds:itemID="{69E9B66B-7C16-40B0-A7F8-76E76601D271}">
+  <ds:schemaRefs>
+    <ds:schemaRef ds:uri="http://purl.org/dc/terms/"/>
+    <ds:schemaRef ds:uri="http://schemas.openxmlformats.org/package/2006/metadata/core-properties"/>
+    <ds:schemaRef ds:uri="http://schemas.microsoft.com/office/2006/documentManagement/types"/>
+    <ds:schemaRef ds:uri="http://schemas.microsoft.com/office/infopath/2007/PartnerControls"/>
+    <ds:schemaRef ds:uri="http://purl.org/dc/elements/1.1/"/>
+    <ds:schemaRef ds:uri="http://schemas.microsoft.com/office/2006/metadata/properties"/>
+    <ds:schemaRef ds:uri="5845f703-aefd-4152-9ce7-4004e1ab5465"/>
+    <ds:schemaRef ds:uri="ec776a2e-aa90-42fe-8c76-cfe3819c2a73"/>
+    <ds:schemaRef ds:uri="http://www.w3.org/XML/1998/namespace"/>
+    <ds:schemaRef ds:uri="http://purl.org/dc/dcmitype/"/>
+  </ds:schemaRefs>
+</ds:datastoreItem>
 </file>
 
-<file path=customXml/itemProps1.xml><?xml version="1.0" encoding="utf-8"?>
+<file path=customXml/itemProps3.xml><?xml version="1.0" encoding="utf-8"?>
 <ds:datastoreItem xmlns:ds="http://schemas.openxmlformats.org/officeDocument/2006/customXml" ds:itemID="{E63CBA41-CABD-4ECA-8932-EC17128D401B}">
   <ds:schemaRefs>
     <ds:schemaRef ds:uri="http://schemas.microsoft.com/office/2006/metadata/contentType"/>
@@ -6097,29 +6371,4 @@
     <ds:schemaRef ds:uri="http://schemas.microsoft.com/internal/obd"/>
   </ds:schemaRefs>
 </ds:datastoreItem>
-</file>
-
-<file path=customXml/itemProps2.xml><?xml version="1.0" encoding="utf-8"?>
-<ds:datastoreItem xmlns:ds="http://schemas.openxmlformats.org/officeDocument/2006/customXml" ds:itemID="{73C6DE5B-6871-4252-8E55-5680072875AF}">
-  <ds:schemaRefs>
-    <ds:schemaRef ds:uri="http://schemas.microsoft.com/sharepoint/v3/contenttype/forms"/>
-  </ds:schemaRefs>
-</ds:datastoreItem>
-</file>
-
-<file path=customXml/itemProps3.xml><?xml version="1.0" encoding="utf-8"?>
-<ds:datastoreItem xmlns:ds="http://schemas.openxmlformats.org/officeDocument/2006/customXml" ds:itemID="{69E9B66B-7C16-40B0-A7F8-76E76601D271}">
-  <ds:schemaRefs>
-    <ds:schemaRef ds:uri="http://schemas.microsoft.com/office/2006/documentManagement/types"/>
-    <ds:schemaRef ds:uri="http://schemas.microsoft.com/office/infopath/2007/PartnerControls"/>
-    <ds:schemaRef ds:uri="ec776a2e-aa90-42fe-8c76-cfe3819c2a73"/>
-    <ds:schemaRef ds:uri="http://purl.org/dc/elements/1.1/"/>
-    <ds:schemaRef ds:uri="http://schemas.microsoft.com/office/2006/metadata/properties"/>
-    <ds:schemaRef ds:uri="5845f703-aefd-4152-9ce7-4004e1ab5465"/>
-    <ds:schemaRef ds:uri="http://purl.org/dc/terms/"/>
-    <ds:schemaRef ds:uri="http://schemas.openxmlformats.org/package/2006/metadata/core-properties"/>
-    <ds:schemaRef ds:uri="http://www.w3.org/XML/1998/namespace"/>
-    <ds:schemaRef ds:uri="http://purl.org/dc/dcmitype/"/>
-  </ds:schemaRefs>
-</ds:datastoreItem>
 </file>
</xml_diff>